<commit_message>
Myoko lettertype en presentatie
dit moest van Dees, ik ben bang, help
</commit_message>
<xml_diff>
--- a/Presentatie/NinjaOutbreak.pptx
+++ b/Presentatie/NinjaOutbreak.pptx
@@ -251,7 +251,7 @@
           <a:p>
             <a:fld id="{B88BB0DE-B641-421E-B315-AFCEF8F26F70}" type="datetimeFigureOut">
               <a:rPr lang="en-GB" smtClean="0"/>
-              <a:t>10/11/2016</a:t>
+              <a:t>11/11/2016</a:t>
             </a:fld>
             <a:endParaRPr lang="en-GB"/>
           </a:p>
@@ -421,7 +421,7 @@
           <a:p>
             <a:fld id="{B88BB0DE-B641-421E-B315-AFCEF8F26F70}" type="datetimeFigureOut">
               <a:rPr lang="en-GB" smtClean="0"/>
-              <a:t>10/11/2016</a:t>
+              <a:t>11/11/2016</a:t>
             </a:fld>
             <a:endParaRPr lang="en-GB"/>
           </a:p>
@@ -601,7 +601,7 @@
           <a:p>
             <a:fld id="{B88BB0DE-B641-421E-B315-AFCEF8F26F70}" type="datetimeFigureOut">
               <a:rPr lang="en-GB" smtClean="0"/>
-              <a:t>10/11/2016</a:t>
+              <a:t>11/11/2016</a:t>
             </a:fld>
             <a:endParaRPr lang="en-GB"/>
           </a:p>
@@ -771,7 +771,7 @@
           <a:p>
             <a:fld id="{B88BB0DE-B641-421E-B315-AFCEF8F26F70}" type="datetimeFigureOut">
               <a:rPr lang="en-GB" smtClean="0"/>
-              <a:t>10/11/2016</a:t>
+              <a:t>11/11/2016</a:t>
             </a:fld>
             <a:endParaRPr lang="en-GB"/>
           </a:p>
@@ -1017,7 +1017,7 @@
           <a:p>
             <a:fld id="{B88BB0DE-B641-421E-B315-AFCEF8F26F70}" type="datetimeFigureOut">
               <a:rPr lang="en-GB" smtClean="0"/>
-              <a:t>10/11/2016</a:t>
+              <a:t>11/11/2016</a:t>
             </a:fld>
             <a:endParaRPr lang="en-GB"/>
           </a:p>
@@ -1249,7 +1249,7 @@
           <a:p>
             <a:fld id="{B88BB0DE-B641-421E-B315-AFCEF8F26F70}" type="datetimeFigureOut">
               <a:rPr lang="en-GB" smtClean="0"/>
-              <a:t>10/11/2016</a:t>
+              <a:t>11/11/2016</a:t>
             </a:fld>
             <a:endParaRPr lang="en-GB"/>
           </a:p>
@@ -1616,7 +1616,7 @@
           <a:p>
             <a:fld id="{B88BB0DE-B641-421E-B315-AFCEF8F26F70}" type="datetimeFigureOut">
               <a:rPr lang="en-GB" smtClean="0"/>
-              <a:t>10/11/2016</a:t>
+              <a:t>11/11/2016</a:t>
             </a:fld>
             <a:endParaRPr lang="en-GB"/>
           </a:p>
@@ -1734,7 +1734,7 @@
           <a:p>
             <a:fld id="{B88BB0DE-B641-421E-B315-AFCEF8F26F70}" type="datetimeFigureOut">
               <a:rPr lang="en-GB" smtClean="0"/>
-              <a:t>10/11/2016</a:t>
+              <a:t>11/11/2016</a:t>
             </a:fld>
             <a:endParaRPr lang="en-GB"/>
           </a:p>
@@ -1829,7 +1829,7 @@
           <a:p>
             <a:fld id="{B88BB0DE-B641-421E-B315-AFCEF8F26F70}" type="datetimeFigureOut">
               <a:rPr lang="en-GB" smtClean="0"/>
-              <a:t>10/11/2016</a:t>
+              <a:t>11/11/2016</a:t>
             </a:fld>
             <a:endParaRPr lang="en-GB"/>
           </a:p>
@@ -2106,7 +2106,7 @@
           <a:p>
             <a:fld id="{B88BB0DE-B641-421E-B315-AFCEF8F26F70}" type="datetimeFigureOut">
               <a:rPr lang="en-GB" smtClean="0"/>
-              <a:t>10/11/2016</a:t>
+              <a:t>11/11/2016</a:t>
             </a:fld>
             <a:endParaRPr lang="en-GB"/>
           </a:p>
@@ -2359,7 +2359,7 @@
           <a:p>
             <a:fld id="{B88BB0DE-B641-421E-B315-AFCEF8F26F70}" type="datetimeFigureOut">
               <a:rPr lang="en-GB" smtClean="0"/>
-              <a:t>10/11/2016</a:t>
+              <a:t>11/11/2016</a:t>
             </a:fld>
             <a:endParaRPr lang="en-GB"/>
           </a:p>
@@ -2572,7 +2572,7 @@
           <a:p>
             <a:fld id="{B88BB0DE-B641-421E-B315-AFCEF8F26F70}" type="datetimeFigureOut">
               <a:rPr lang="en-GB" smtClean="0"/>
-              <a:t>10/11/2016</a:t>
+              <a:t>11/11/2016</a:t>
             </a:fld>
             <a:endParaRPr lang="en-GB"/>
           </a:p>
@@ -3148,7 +3148,7 @@
         <p:spPr>
           <a:xfrm>
             <a:off x="1263972" y="1527572"/>
-            <a:ext cx="4924927" cy="4893647"/>
+            <a:ext cx="5567651" cy="4893647"/>
           </a:xfrm>
           <a:prstGeom prst="rect">
             <a:avLst/>
@@ -3203,7 +3203,19 @@
               <a:rPr lang="en-GB" sz="2400" dirty="0">
                 <a:latin typeface="Moyko" panose="02000506080000020004" pitchFamily="2" charset="0"/>
               </a:rPr>
-              <a:t>- Benjamin ( Lead Art )</a:t>
+              <a:t>- Benjamin </a:t>
+            </a:r>
+            <a:r>
+              <a:rPr lang="en-GB" sz="2400" dirty="0" err="1">
+                <a:latin typeface="Moyko" panose="02000506080000020004" pitchFamily="2" charset="0"/>
+              </a:rPr>
+              <a:t>Vos</a:t>
+            </a:r>
+            <a:r>
+              <a:rPr lang="en-GB" sz="2400" dirty="0">
+                <a:latin typeface="Moyko" panose="02000506080000020004" pitchFamily="2" charset="0"/>
+              </a:rPr>
+              <a:t> ( Lead Art )</a:t>
             </a:r>
           </a:p>
           <a:p>
@@ -3267,10 +3279,16 @@
               <a:buChar char="-"/>
             </a:pPr>
             <a:r>
+              <a:rPr lang="en-GB" sz="2400" dirty="0">
+                <a:latin typeface="Moyko" panose="02000506080000020004" pitchFamily="2" charset="0"/>
+              </a:rPr>
+              <a:t>Rief </a:t>
+            </a:r>
+            <a:r>
               <a:rPr lang="en-GB" sz="2400" dirty="0" err="1">
                 <a:latin typeface="Moyko" panose="02000506080000020004" pitchFamily="2" charset="0"/>
               </a:rPr>
-              <a:t>Rief</a:t>
+              <a:t>Haalboom</a:t>
             </a:r>
             <a:r>
               <a:rPr lang="en-GB" sz="2400" dirty="0">
@@ -3309,7 +3327,7 @@
               <a:rPr lang="en-GB" sz="2400" dirty="0">
                 <a:latin typeface="Moyko" panose="02000506080000020004" pitchFamily="2" charset="0"/>
               </a:rPr>
-              <a:t>Paige ( </a:t>
+              <a:t>Paige Bemelmans ( </a:t>
             </a:r>
             <a:r>
               <a:rPr lang="en-GB" sz="2400" dirty="0" err="1">
@@ -3480,7 +3498,7 @@
         <p:spPr>
           <a:xfrm>
             <a:off x="1263972" y="1527572"/>
-            <a:ext cx="4924927" cy="4154984"/>
+            <a:ext cx="5013736" cy="4154984"/>
           </a:xfrm>
           <a:prstGeom prst="rect">
             <a:avLst/>
@@ -3503,7 +3521,7 @@
               <a:rPr lang="en-GB" sz="2400" dirty="0" err="1">
                 <a:latin typeface="Moyko" panose="02000506080000020004" pitchFamily="2" charset="0"/>
               </a:rPr>
-              <a:t>verhaal</a:t>
+              <a:t>Verhaal</a:t>
             </a:r>
             <a:endParaRPr lang="en-GB" sz="2400" dirty="0">
               <a:latin typeface="Moyko" panose="02000506080000020004" pitchFamily="2" charset="0"/>
@@ -3519,7 +3537,7 @@
               <a:rPr lang="en-GB" sz="2400" dirty="0">
                 <a:latin typeface="Moyko" panose="02000506080000020004" pitchFamily="2" charset="0"/>
               </a:rPr>
-              <a:t>- de Gameplay</a:t>
+              <a:t>- De Gameplay</a:t>
             </a:r>
           </a:p>
           <a:p>

</xml_diff>